<commit_message>
feat: sparse & variable
</commit_message>
<xml_diff>
--- a/组会3.24GNN.pptx
+++ b/组会3.24GNN.pptx
@@ -228,7 +228,7 @@
           <a:p>
             <a:fld id="{5F273A26-202E-431B-AD76-A5F023416F0D}" type="datetimeFigureOut">
               <a:rPr lang="zh-CN" altLang="en-US" smtClean="0"/>
-              <a:t>2022/3/22</a:t>
+              <a:t>2022/3/23</a:t>
             </a:fld>
             <a:endParaRPr lang="zh-CN" altLang="en-US"/>
           </a:p>
@@ -1437,7 +1437,7 @@
           <a:p>
             <a:fld id="{D2DA14B7-EFA4-4552-9A35-108FC461037B}" type="datetime1">
               <a:rPr lang="zh-CN" altLang="en-US" smtClean="0"/>
-              <a:t>2022/3/22</a:t>
+              <a:t>2022/3/23</a:t>
             </a:fld>
             <a:endParaRPr lang="zh-CN" altLang="en-US"/>
           </a:p>
@@ -1609,7 +1609,7 @@
           <a:p>
             <a:fld id="{7B2AF473-7D85-46E5-818E-5B009CB9D0E2}" type="datetime1">
               <a:rPr lang="zh-CN" altLang="en-US" smtClean="0"/>
-              <a:t>2022/3/22</a:t>
+              <a:t>2022/3/23</a:t>
             </a:fld>
             <a:endParaRPr lang="zh-CN" altLang="en-US"/>
           </a:p>
@@ -1784,7 +1784,7 @@
           <a:p>
             <a:fld id="{3C4D3159-4E25-4F06-B17A-E551EA2A014F}" type="datetime1">
               <a:rPr lang="zh-CN" altLang="en-US" smtClean="0"/>
-              <a:t>2022/3/22</a:t>
+              <a:t>2022/3/23</a:t>
             </a:fld>
             <a:endParaRPr lang="zh-CN" altLang="en-US"/>
           </a:p>
@@ -2002,7 +2002,7 @@
           <a:p>
             <a:fld id="{25ED9F82-50BF-416A-84C5-BEBB50BB99AF}" type="datetime1">
               <a:rPr lang="zh-CN" altLang="en-US" smtClean="0"/>
-              <a:t>2022/3/22</a:t>
+              <a:t>2022/3/23</a:t>
             </a:fld>
             <a:endParaRPr lang="zh-CN" altLang="en-US"/>
           </a:p>
@@ -2385,7 +2385,7 @@
           <a:p>
             <a:fld id="{FE43C476-6102-4371-9CDB-C438C8C363FD}" type="datetime1">
               <a:rPr lang="zh-CN" altLang="en-US" smtClean="0"/>
-              <a:t>2022/3/22</a:t>
+              <a:t>2022/3/23</a:t>
             </a:fld>
             <a:endParaRPr lang="zh-CN" altLang="en-US"/>
           </a:p>
@@ -2619,7 +2619,7 @@
           <a:p>
             <a:fld id="{4F38462B-42B2-454F-A088-DB5E8117633F}" type="datetime1">
               <a:rPr lang="zh-CN" altLang="en-US" smtClean="0"/>
-              <a:t>2022/3/22</a:t>
+              <a:t>2022/3/23</a:t>
             </a:fld>
             <a:endParaRPr lang="zh-CN" altLang="en-US"/>
           </a:p>
@@ -2988,7 +2988,7 @@
           <a:p>
             <a:fld id="{189FC360-3D03-4AEF-8660-10EB205FCE15}" type="datetime1">
               <a:rPr lang="zh-CN" altLang="en-US" smtClean="0"/>
-              <a:t>2022/3/22</a:t>
+              <a:t>2022/3/23</a:t>
             </a:fld>
             <a:endParaRPr lang="zh-CN" altLang="en-US"/>
           </a:p>
@@ -3101,7 +3101,7 @@
           <a:p>
             <a:fld id="{858C2E6C-0097-4171-A137-E6260F915C38}" type="datetime1">
               <a:rPr lang="zh-CN" altLang="en-US" smtClean="0"/>
-              <a:t>2022/3/22</a:t>
+              <a:t>2022/3/23</a:t>
             </a:fld>
             <a:endParaRPr lang="zh-CN" altLang="en-US"/>
           </a:p>
@@ -3191,7 +3191,7 @@
           <a:p>
             <a:fld id="{7AFE4A2B-517A-41F3-86E1-CC0FE98B087F}" type="datetime1">
               <a:rPr lang="zh-CN" altLang="en-US" smtClean="0"/>
-              <a:t>2022/3/22</a:t>
+              <a:t>2022/3/23</a:t>
             </a:fld>
             <a:endParaRPr lang="zh-CN" altLang="en-US"/>
           </a:p>
@@ -3463,7 +3463,7 @@
           <a:p>
             <a:fld id="{6BC4A481-D110-4405-8D29-7F4C8B8C5605}" type="datetime1">
               <a:rPr lang="zh-CN" altLang="en-US" smtClean="0"/>
-              <a:t>2022/3/22</a:t>
+              <a:t>2022/3/23</a:t>
             </a:fld>
             <a:endParaRPr lang="zh-CN" altLang="en-US"/>
           </a:p>
@@ -3711,7 +3711,7 @@
           <a:p>
             <a:fld id="{DE264D7F-A3B6-4CE8-9A1A-A86D617CC5CF}" type="datetime1">
               <a:rPr lang="zh-CN" altLang="en-US" smtClean="0"/>
-              <a:t>2022/3/22</a:t>
+              <a:t>2022/3/23</a:t>
             </a:fld>
             <a:endParaRPr lang="zh-CN" altLang="en-US"/>
           </a:p>
@@ -3919,7 +3919,7 @@
           <a:p>
             <a:fld id="{C399469A-CC65-4820-8272-D84B923EF7A4}" type="datetime1">
               <a:rPr lang="zh-CN" altLang="en-US" smtClean="0"/>
-              <a:t>2022/3/22</a:t>
+              <a:t>2022/3/23</a:t>
             </a:fld>
             <a:endParaRPr lang="zh-CN" altLang="en-US"/>
           </a:p>
@@ -4488,14 +4488,14 @@
                 <a:gridCol w="2518189">
                   <a:extLst>
                     <a:ext uri="{9D8B030D-6E8A-4147-A177-3AD203B41FA5}">
-                      <a16:colId xmlns:a16="http://schemas.microsoft.com/office/drawing/2014/main" xmlns="" val="20000"/>
+                      <a16:colId xmlns="" xmlns:a16="http://schemas.microsoft.com/office/drawing/2014/main" val="20000"/>
                     </a:ext>
                   </a:extLst>
                 </a:gridCol>
                 <a:gridCol w="5972258">
                   <a:extLst>
                     <a:ext uri="{9D8B030D-6E8A-4147-A177-3AD203B41FA5}">
-                      <a16:colId xmlns:a16="http://schemas.microsoft.com/office/drawing/2014/main" xmlns="" val="20001"/>
+                      <a16:colId xmlns="" xmlns:a16="http://schemas.microsoft.com/office/drawing/2014/main" val="20001"/>
                     </a:ext>
                   </a:extLst>
                 </a:gridCol>
@@ -4642,7 +4642,7 @@
                 </a:tc>
                 <a:extLst>
                   <a:ext uri="{0D108BD9-81ED-4DB2-BD59-A6C34878D82A}">
-                    <a16:rowId xmlns:a16="http://schemas.microsoft.com/office/drawing/2014/main" xmlns="" val="10000"/>
+                    <a16:rowId xmlns="" xmlns:a16="http://schemas.microsoft.com/office/drawing/2014/main" val="10000"/>
                   </a:ext>
                 </a:extLst>
               </a:tr>
@@ -4778,7 +4778,7 @@
                 </a:tc>
                 <a:extLst>
                   <a:ext uri="{0D108BD9-81ED-4DB2-BD59-A6C34878D82A}">
-                    <a16:rowId xmlns:a16="http://schemas.microsoft.com/office/drawing/2014/main" xmlns="" val="10001"/>
+                    <a16:rowId xmlns="" xmlns:a16="http://schemas.microsoft.com/office/drawing/2014/main" val="10001"/>
                   </a:ext>
                 </a:extLst>
               </a:tr>
@@ -4921,7 +4921,7 @@
                 </a:tc>
                 <a:extLst>
                   <a:ext uri="{0D108BD9-81ED-4DB2-BD59-A6C34878D82A}">
-                    <a16:rowId xmlns:a16="http://schemas.microsoft.com/office/drawing/2014/main" xmlns="" val="10002"/>
+                    <a16:rowId xmlns="" xmlns:a16="http://schemas.microsoft.com/office/drawing/2014/main" val="10002"/>
                   </a:ext>
                 </a:extLst>
               </a:tr>
@@ -5048,7 +5048,7 @@
                 </a:tc>
                 <a:extLst>
                   <a:ext uri="{0D108BD9-81ED-4DB2-BD59-A6C34878D82A}">
-                    <a16:rowId xmlns:a16="http://schemas.microsoft.com/office/drawing/2014/main" xmlns="" val="10003"/>
+                    <a16:rowId xmlns="" xmlns:a16="http://schemas.microsoft.com/office/drawing/2014/main" val="10003"/>
                   </a:ext>
                 </a:extLst>
               </a:tr>
@@ -6203,7 +6203,7 @@
           <a:blip r:embed="rId4">
             <a:extLst>
               <a:ext uri="{96DAC541-7B7A-43D3-8B79-37D633B846F1}">
-                <asvg:svgBlip xmlns="" xmlns:asvg="http://schemas.microsoft.com/office/drawing/2016/SVG/main" r:embed="rId5"/>
+                <asvg:svgBlip xmlns:asvg="http://schemas.microsoft.com/office/drawing/2016/SVG/main" xmlns="" r:embed="rId5"/>
               </a:ext>
             </a:extLst>
           </a:blip>
@@ -6233,7 +6233,7 @@
           <a:blip r:embed="rId4">
             <a:extLst>
               <a:ext uri="{96DAC541-7B7A-43D3-8B79-37D633B846F1}">
-                <asvg:svgBlip xmlns="" xmlns:asvg="http://schemas.microsoft.com/office/drawing/2016/SVG/main" r:embed="rId5"/>
+                <asvg:svgBlip xmlns:asvg="http://schemas.microsoft.com/office/drawing/2016/SVG/main" xmlns="" r:embed="rId5"/>
               </a:ext>
             </a:extLst>
           </a:blip>
@@ -7553,7 +7553,7 @@
           <a:blip r:embed="rId4">
             <a:extLst>
               <a:ext uri="{96DAC541-7B7A-43D3-8B79-37D633B846F1}">
-                <asvg:svgBlip xmlns="" xmlns:asvg="http://schemas.microsoft.com/office/drawing/2016/SVG/main" r:embed="rId5"/>
+                <asvg:svgBlip xmlns:asvg="http://schemas.microsoft.com/office/drawing/2016/SVG/main" xmlns="" r:embed="rId5"/>
               </a:ext>
             </a:extLst>
           </a:blip>
@@ -7583,7 +7583,7 @@
           <a:blip r:embed="rId4">
             <a:extLst>
               <a:ext uri="{96DAC541-7B7A-43D3-8B79-37D633B846F1}">
-                <asvg:svgBlip xmlns="" xmlns:asvg="http://schemas.microsoft.com/office/drawing/2016/SVG/main" r:embed="rId5"/>
+                <asvg:svgBlip xmlns:asvg="http://schemas.microsoft.com/office/drawing/2016/SVG/main" xmlns="" r:embed="rId5"/>
               </a:ext>
             </a:extLst>
           </a:blip>
@@ -7613,7 +7613,7 @@
           <a:blip r:embed="rId4">
             <a:extLst>
               <a:ext uri="{96DAC541-7B7A-43D3-8B79-37D633B846F1}">
-                <asvg:svgBlip xmlns="" xmlns:asvg="http://schemas.microsoft.com/office/drawing/2016/SVG/main" r:embed="rId5"/>
+                <asvg:svgBlip xmlns:asvg="http://schemas.microsoft.com/office/drawing/2016/SVG/main" xmlns="" r:embed="rId5"/>
               </a:ext>
             </a:extLst>
           </a:blip>
@@ -7636,7 +7636,7 @@
           <p:cNvPr id="13" name="矩形 12">
             <a:extLst>
               <a:ext uri="{FF2B5EF4-FFF2-40B4-BE49-F238E27FC236}">
-                <a16:creationId xmlns:a16="http://schemas.microsoft.com/office/drawing/2014/main" xmlns="" id="{FE6CE1C5-47F9-4C6E-AD3F-D63883C9C6D1}"/>
+                <a16:creationId xmlns="" xmlns:a16="http://schemas.microsoft.com/office/drawing/2014/main" id="{FE6CE1C5-47F9-4C6E-AD3F-D63883C9C6D1}"/>
               </a:ext>
             </a:extLst>
           </p:cNvPr>
@@ -7680,7 +7680,7 @@
           <p:cNvPr id="14" name="椭圆 13">
             <a:extLst>
               <a:ext uri="{FF2B5EF4-FFF2-40B4-BE49-F238E27FC236}">
-                <a16:creationId xmlns:a16="http://schemas.microsoft.com/office/drawing/2014/main" xmlns="" id="{E7603584-2625-48C8-8AE6-25BBFB217C07}"/>
+                <a16:creationId xmlns="" xmlns:a16="http://schemas.microsoft.com/office/drawing/2014/main" id="{E7603584-2625-48C8-8AE6-25BBFB217C07}"/>
               </a:ext>
             </a:extLst>
           </p:cNvPr>
@@ -7739,7 +7739,7 @@
           <p:cNvPr id="15" name="矩形 14">
             <a:extLst>
               <a:ext uri="{FF2B5EF4-FFF2-40B4-BE49-F238E27FC236}">
-                <a16:creationId xmlns:a16="http://schemas.microsoft.com/office/drawing/2014/main" xmlns="" id="{FE6CE1C5-47F9-4C6E-AD3F-D63883C9C6D1}"/>
+                <a16:creationId xmlns="" xmlns:a16="http://schemas.microsoft.com/office/drawing/2014/main" id="{FE6CE1C5-47F9-4C6E-AD3F-D63883C9C6D1}"/>
               </a:ext>
             </a:extLst>
           </p:cNvPr>
@@ -7784,7 +7784,7 @@
           <p:cNvPr id="16" name="椭圆 15">
             <a:extLst>
               <a:ext uri="{FF2B5EF4-FFF2-40B4-BE49-F238E27FC236}">
-                <a16:creationId xmlns:a16="http://schemas.microsoft.com/office/drawing/2014/main" xmlns="" id="{E7603584-2625-48C8-8AE6-25BBFB217C07}"/>
+                <a16:creationId xmlns="" xmlns:a16="http://schemas.microsoft.com/office/drawing/2014/main" id="{E7603584-2625-48C8-8AE6-25BBFB217C07}"/>
               </a:ext>
             </a:extLst>
           </p:cNvPr>
@@ -7843,7 +7843,7 @@
           <p:cNvPr id="17" name="椭圆 16">
             <a:extLst>
               <a:ext uri="{FF2B5EF4-FFF2-40B4-BE49-F238E27FC236}">
-                <a16:creationId xmlns:a16="http://schemas.microsoft.com/office/drawing/2014/main" xmlns="" id="{E7603584-2625-48C8-8AE6-25BBFB217C07}"/>
+                <a16:creationId xmlns="" xmlns:a16="http://schemas.microsoft.com/office/drawing/2014/main" id="{E7603584-2625-48C8-8AE6-25BBFB217C07}"/>
               </a:ext>
             </a:extLst>
           </p:cNvPr>
@@ -7902,7 +7902,7 @@
           <p:cNvPr id="18" name="矩形 17">
             <a:extLst>
               <a:ext uri="{FF2B5EF4-FFF2-40B4-BE49-F238E27FC236}">
-                <a16:creationId xmlns:a16="http://schemas.microsoft.com/office/drawing/2014/main" xmlns="" id="{FE6CE1C5-47F9-4C6E-AD3F-D63883C9C6D1}"/>
+                <a16:creationId xmlns="" xmlns:a16="http://schemas.microsoft.com/office/drawing/2014/main" id="{FE6CE1C5-47F9-4C6E-AD3F-D63883C9C6D1}"/>
               </a:ext>
             </a:extLst>
           </p:cNvPr>
@@ -7952,7 +7952,7 @@
           <p:cNvPr id="19" name="矩形 18">
             <a:extLst>
               <a:ext uri="{FF2B5EF4-FFF2-40B4-BE49-F238E27FC236}">
-                <a16:creationId xmlns:a16="http://schemas.microsoft.com/office/drawing/2014/main" xmlns="" id="{FE6CE1C5-47F9-4C6E-AD3F-D63883C9C6D1}"/>
+                <a16:creationId xmlns="" xmlns:a16="http://schemas.microsoft.com/office/drawing/2014/main" id="{FE6CE1C5-47F9-4C6E-AD3F-D63883C9C6D1}"/>
               </a:ext>
             </a:extLst>
           </p:cNvPr>
@@ -8002,7 +8002,7 @@
           <p:cNvPr id="20" name="矩形 19">
             <a:extLst>
               <a:ext uri="{FF2B5EF4-FFF2-40B4-BE49-F238E27FC236}">
-                <a16:creationId xmlns:a16="http://schemas.microsoft.com/office/drawing/2014/main" xmlns="" id="{FE6CE1C5-47F9-4C6E-AD3F-D63883C9C6D1}"/>
+                <a16:creationId xmlns="" xmlns:a16="http://schemas.microsoft.com/office/drawing/2014/main" id="{FE6CE1C5-47F9-4C6E-AD3F-D63883C9C6D1}"/>
               </a:ext>
             </a:extLst>
           </p:cNvPr>
@@ -8046,7 +8046,7 @@
           <p:cNvPr id="21" name="椭圆 20">
             <a:extLst>
               <a:ext uri="{FF2B5EF4-FFF2-40B4-BE49-F238E27FC236}">
-                <a16:creationId xmlns:a16="http://schemas.microsoft.com/office/drawing/2014/main" xmlns="" id="{E7603584-2625-48C8-8AE6-25BBFB217C07}"/>
+                <a16:creationId xmlns="" xmlns:a16="http://schemas.microsoft.com/office/drawing/2014/main" id="{E7603584-2625-48C8-8AE6-25BBFB217C07}"/>
               </a:ext>
             </a:extLst>
           </p:cNvPr>
@@ -8105,7 +8105,7 @@
           <p:cNvPr id="22" name="椭圆 21">
             <a:extLst>
               <a:ext uri="{FF2B5EF4-FFF2-40B4-BE49-F238E27FC236}">
-                <a16:creationId xmlns:a16="http://schemas.microsoft.com/office/drawing/2014/main" xmlns="" id="{E7603584-2625-48C8-8AE6-25BBFB217C07}"/>
+                <a16:creationId xmlns="" xmlns:a16="http://schemas.microsoft.com/office/drawing/2014/main" id="{E7603584-2625-48C8-8AE6-25BBFB217C07}"/>
               </a:ext>
             </a:extLst>
           </p:cNvPr>
@@ -8164,7 +8164,7 @@
           <p:cNvPr id="23" name="椭圆 22">
             <a:extLst>
               <a:ext uri="{FF2B5EF4-FFF2-40B4-BE49-F238E27FC236}">
-                <a16:creationId xmlns:a16="http://schemas.microsoft.com/office/drawing/2014/main" xmlns="" id="{E7603584-2625-48C8-8AE6-25BBFB217C07}"/>
+                <a16:creationId xmlns="" xmlns:a16="http://schemas.microsoft.com/office/drawing/2014/main" id="{E7603584-2625-48C8-8AE6-25BBFB217C07}"/>
               </a:ext>
             </a:extLst>
           </p:cNvPr>
@@ -8223,7 +8223,7 @@
           <p:cNvPr id="24" name="矩形 23">
             <a:extLst>
               <a:ext uri="{FF2B5EF4-FFF2-40B4-BE49-F238E27FC236}">
-                <a16:creationId xmlns:a16="http://schemas.microsoft.com/office/drawing/2014/main" xmlns="" id="{FE6CE1C5-47F9-4C6E-AD3F-D63883C9C6D1}"/>
+                <a16:creationId xmlns="" xmlns:a16="http://schemas.microsoft.com/office/drawing/2014/main" id="{FE6CE1C5-47F9-4C6E-AD3F-D63883C9C6D1}"/>
               </a:ext>
             </a:extLst>
           </p:cNvPr>
@@ -8276,7 +8276,7 @@
           <p:cNvPr id="25" name="矩形 24">
             <a:extLst>
               <a:ext uri="{FF2B5EF4-FFF2-40B4-BE49-F238E27FC236}">
-                <a16:creationId xmlns:a16="http://schemas.microsoft.com/office/drawing/2014/main" xmlns="" id="{FE6CE1C5-47F9-4C6E-AD3F-D63883C9C6D1}"/>
+                <a16:creationId xmlns="" xmlns:a16="http://schemas.microsoft.com/office/drawing/2014/main" id="{FE6CE1C5-47F9-4C6E-AD3F-D63883C9C6D1}"/>
               </a:ext>
             </a:extLst>
           </p:cNvPr>
@@ -8329,7 +8329,7 @@
           <p:cNvPr id="26" name="矩形 25">
             <a:extLst>
               <a:ext uri="{FF2B5EF4-FFF2-40B4-BE49-F238E27FC236}">
-                <a16:creationId xmlns:a16="http://schemas.microsoft.com/office/drawing/2014/main" xmlns="" id="{FE6CE1C5-47F9-4C6E-AD3F-D63883C9C6D1}"/>
+                <a16:creationId xmlns="" xmlns:a16="http://schemas.microsoft.com/office/drawing/2014/main" id="{FE6CE1C5-47F9-4C6E-AD3F-D63883C9C6D1}"/>
               </a:ext>
             </a:extLst>
           </p:cNvPr>
@@ -8382,7 +8382,7 @@
           <p:cNvPr id="27" name="矩形 26">
             <a:extLst>
               <a:ext uri="{FF2B5EF4-FFF2-40B4-BE49-F238E27FC236}">
-                <a16:creationId xmlns:a16="http://schemas.microsoft.com/office/drawing/2014/main" xmlns="" id="{FE6CE1C5-47F9-4C6E-AD3F-D63883C9C6D1}"/>
+                <a16:creationId xmlns="" xmlns:a16="http://schemas.microsoft.com/office/drawing/2014/main" id="{FE6CE1C5-47F9-4C6E-AD3F-D63883C9C6D1}"/>
               </a:ext>
             </a:extLst>
           </p:cNvPr>
@@ -8830,7 +8830,7 @@
           <p:cNvPr id="39" name="矩形 38">
             <a:extLst>
               <a:ext uri="{FF2B5EF4-FFF2-40B4-BE49-F238E27FC236}">
-                <a16:creationId xmlns:a16="http://schemas.microsoft.com/office/drawing/2014/main" xmlns="" id="{FE6CE1C5-47F9-4C6E-AD3F-D63883C9C6D1}"/>
+                <a16:creationId xmlns="" xmlns:a16="http://schemas.microsoft.com/office/drawing/2014/main" id="{FE6CE1C5-47F9-4C6E-AD3F-D63883C9C6D1}"/>
               </a:ext>
             </a:extLst>
           </p:cNvPr>
@@ -8883,7 +8883,7 @@
           <p:cNvPr id="40" name="矩形 39">
             <a:extLst>
               <a:ext uri="{FF2B5EF4-FFF2-40B4-BE49-F238E27FC236}">
-                <a16:creationId xmlns:a16="http://schemas.microsoft.com/office/drawing/2014/main" xmlns="" id="{FE6CE1C5-47F9-4C6E-AD3F-D63883C9C6D1}"/>
+                <a16:creationId xmlns="" xmlns:a16="http://schemas.microsoft.com/office/drawing/2014/main" id="{FE6CE1C5-47F9-4C6E-AD3F-D63883C9C6D1}"/>
               </a:ext>
             </a:extLst>
           </p:cNvPr>
@@ -9088,7 +9088,7 @@
           <p:cNvPr id="45" name="矩形 44">
             <a:extLst>
               <a:ext uri="{FF2B5EF4-FFF2-40B4-BE49-F238E27FC236}">
-                <a16:creationId xmlns:a16="http://schemas.microsoft.com/office/drawing/2014/main" xmlns="" id="{FE6CE1C5-47F9-4C6E-AD3F-D63883C9C6D1}"/>
+                <a16:creationId xmlns="" xmlns:a16="http://schemas.microsoft.com/office/drawing/2014/main" id="{FE6CE1C5-47F9-4C6E-AD3F-D63883C9C6D1}"/>
               </a:ext>
             </a:extLst>
           </p:cNvPr>
@@ -9141,7 +9141,7 @@
           <p:cNvPr id="46" name="矩形 45">
             <a:extLst>
               <a:ext uri="{FF2B5EF4-FFF2-40B4-BE49-F238E27FC236}">
-                <a16:creationId xmlns:a16="http://schemas.microsoft.com/office/drawing/2014/main" xmlns="" id="{FE6CE1C5-47F9-4C6E-AD3F-D63883C9C6D1}"/>
+                <a16:creationId xmlns="" xmlns:a16="http://schemas.microsoft.com/office/drawing/2014/main" id="{FE6CE1C5-47F9-4C6E-AD3F-D63883C9C6D1}"/>
               </a:ext>
             </a:extLst>
           </p:cNvPr>
@@ -11168,7 +11168,7 @@
           <a:blip r:embed="rId4">
             <a:extLst>
               <a:ext uri="{96DAC541-7B7A-43D3-8B79-37D633B846F1}">
-                <asvg:svgBlip xmlns="" xmlns:asvg="http://schemas.microsoft.com/office/drawing/2016/SVG/main" r:embed="rId5"/>
+                <asvg:svgBlip xmlns:asvg="http://schemas.microsoft.com/office/drawing/2016/SVG/main" xmlns="" r:embed="rId5"/>
               </a:ext>
             </a:extLst>
           </a:blip>
@@ -11198,7 +11198,7 @@
           <a:blip r:embed="rId4">
             <a:extLst>
               <a:ext uri="{96DAC541-7B7A-43D3-8B79-37D633B846F1}">
-                <asvg:svgBlip xmlns="" xmlns:asvg="http://schemas.microsoft.com/office/drawing/2016/SVG/main" r:embed="rId5"/>
+                <asvg:svgBlip xmlns:asvg="http://schemas.microsoft.com/office/drawing/2016/SVG/main" xmlns="" r:embed="rId5"/>
               </a:ext>
             </a:extLst>
           </a:blip>
@@ -11228,7 +11228,7 @@
           <a:blip r:embed="rId4">
             <a:extLst>
               <a:ext uri="{96DAC541-7B7A-43D3-8B79-37D633B846F1}">
-                <asvg:svgBlip xmlns="" xmlns:asvg="http://schemas.microsoft.com/office/drawing/2016/SVG/main" r:embed="rId5"/>
+                <asvg:svgBlip xmlns:asvg="http://schemas.microsoft.com/office/drawing/2016/SVG/main" xmlns="" r:embed="rId5"/>
               </a:ext>
             </a:extLst>
           </a:blip>
@@ -11763,7 +11763,7 @@
           <a:blip r:embed="rId4">
             <a:extLst>
               <a:ext uri="{96DAC541-7B7A-43D3-8B79-37D633B846F1}">
-                <asvg:svgBlip xmlns="" xmlns:asvg="http://schemas.microsoft.com/office/drawing/2016/SVG/main" r:embed="rId5"/>
+                <asvg:svgBlip xmlns:asvg="http://schemas.microsoft.com/office/drawing/2016/SVG/main" xmlns="" r:embed="rId5"/>
               </a:ext>
             </a:extLst>
           </a:blip>
@@ -11793,7 +11793,7 @@
           <a:blip r:embed="rId4">
             <a:extLst>
               <a:ext uri="{96DAC541-7B7A-43D3-8B79-37D633B846F1}">
-                <asvg:svgBlip xmlns="" xmlns:asvg="http://schemas.microsoft.com/office/drawing/2016/SVG/main" r:embed="rId5"/>
+                <asvg:svgBlip xmlns:asvg="http://schemas.microsoft.com/office/drawing/2016/SVG/main" xmlns="" r:embed="rId5"/>
               </a:ext>
             </a:extLst>
           </a:blip>
@@ -12305,7 +12305,7 @@
           <a:blip r:embed="rId3">
             <a:extLst>
               <a:ext uri="{96DAC541-7B7A-43D3-8B79-37D633B846F1}">
-                <asvg:svgBlip xmlns="" xmlns:asvg="http://schemas.microsoft.com/office/drawing/2016/SVG/main" r:embed="rId5"/>
+                <asvg:svgBlip xmlns:asvg="http://schemas.microsoft.com/office/drawing/2016/SVG/main" xmlns="" r:embed="rId5"/>
               </a:ext>
             </a:extLst>
           </a:blip>
@@ -12539,13 +12539,7 @@
               <a:rPr lang="en-US" altLang="zh-CN" sz="2200" i="1" dirty="0" smtClean="0">
                 <a:latin typeface="Cambria Math" panose="02040503050406030204" pitchFamily="18" charset="0"/>
               </a:rPr>
-              <a:t>Energy</a:t>
-            </a:r>
-            <a:r>
-              <a:rPr lang="en-US" altLang="zh-CN" sz="2200" i="1" dirty="0" smtClean="0">
-                <a:latin typeface="Cambria Math" panose="02040503050406030204" pitchFamily="18" charset="0"/>
-              </a:rPr>
-              <a:t>: </a:t>
+              <a:t>Energy: </a:t>
             </a:r>
           </a:p>
           <a:p>
@@ -12563,13 +12557,7 @@
               <a:rPr lang="en-US" altLang="zh-CN" sz="2200" i="1" smtClean="0">
                 <a:latin typeface="Cambria Math" panose="02040503050406030204" pitchFamily="18" charset="0"/>
               </a:rPr>
-              <a:t>(/cycle)</a:t>
-            </a:r>
-            <a:r>
-              <a:rPr lang="en-US" altLang="zh-CN" sz="2200" i="1" smtClean="0">
-                <a:latin typeface="Cambria Math" panose="02040503050406030204" pitchFamily="18" charset="0"/>
-              </a:rPr>
-              <a:t> </a:t>
+              <a:t>(/cycle) </a:t>
             </a:r>
             <a:endParaRPr lang="en-US" altLang="zh-CN" sz="2200" i="1" dirty="0">
               <a:latin typeface="Cambria Math" panose="02040503050406030204" pitchFamily="18" charset="0"/>
@@ -14751,7 +14739,7 @@
           <a:blip r:embed="rId4">
             <a:extLst>
               <a:ext uri="{96DAC541-7B7A-43D3-8B79-37D633B846F1}">
-                <asvg:svgBlip xmlns="" xmlns:asvg="http://schemas.microsoft.com/office/drawing/2016/SVG/main" r:embed="rId5"/>
+                <asvg:svgBlip xmlns:asvg="http://schemas.microsoft.com/office/drawing/2016/SVG/main" xmlns="" r:embed="rId5"/>
               </a:ext>
             </a:extLst>
           </a:blip>
@@ -14781,7 +14769,7 @@
           <a:blip r:embed="rId4">
             <a:extLst>
               <a:ext uri="{96DAC541-7B7A-43D3-8B79-37D633B846F1}">
-                <asvg:svgBlip xmlns="" xmlns:asvg="http://schemas.microsoft.com/office/drawing/2016/SVG/main" r:embed="rId5"/>
+                <asvg:svgBlip xmlns:asvg="http://schemas.microsoft.com/office/drawing/2016/SVG/main" xmlns="" r:embed="rId5"/>
               </a:ext>
             </a:extLst>
           </a:blip>
@@ -14811,7 +14799,7 @@
           <a:blip r:embed="rId4">
             <a:extLst>
               <a:ext uri="{96DAC541-7B7A-43D3-8B79-37D633B846F1}">
-                <asvg:svgBlip xmlns="" xmlns:asvg="http://schemas.microsoft.com/office/drawing/2016/SVG/main" r:embed="rId5"/>
+                <asvg:svgBlip xmlns:asvg="http://schemas.microsoft.com/office/drawing/2016/SVG/main" xmlns="" r:embed="rId5"/>
               </a:ext>
             </a:extLst>
           </a:blip>
@@ -16197,7 +16185,7 @@
           <a:blip r:embed="rId4">
             <a:extLst>
               <a:ext uri="{96DAC541-7B7A-43D3-8B79-37D633B846F1}">
-                <asvg:svgBlip xmlns="" xmlns:asvg="http://schemas.microsoft.com/office/drawing/2016/SVG/main" r:embed="rId5"/>
+                <asvg:svgBlip xmlns:asvg="http://schemas.microsoft.com/office/drawing/2016/SVG/main" xmlns="" r:embed="rId5"/>
               </a:ext>
             </a:extLst>
           </a:blip>
@@ -16227,7 +16215,7 @@
           <a:blip r:embed="rId4">
             <a:extLst>
               <a:ext uri="{96DAC541-7B7A-43D3-8B79-37D633B846F1}">
-                <asvg:svgBlip xmlns="" xmlns:asvg="http://schemas.microsoft.com/office/drawing/2016/SVG/main" r:embed="rId5"/>
+                <asvg:svgBlip xmlns:asvg="http://schemas.microsoft.com/office/drawing/2016/SVG/main" xmlns="" r:embed="rId5"/>
               </a:ext>
             </a:extLst>
           </a:blip>
@@ -17873,7 +17861,7 @@
           <a:blip r:embed="rId4">
             <a:extLst>
               <a:ext uri="{96DAC541-7B7A-43D3-8B79-37D633B846F1}">
-                <asvg:svgBlip xmlns="" xmlns:asvg="http://schemas.microsoft.com/office/drawing/2016/SVG/main" r:embed="rId5"/>
+                <asvg:svgBlip xmlns:asvg="http://schemas.microsoft.com/office/drawing/2016/SVG/main" xmlns="" r:embed="rId5"/>
               </a:ext>
             </a:extLst>
           </a:blip>
@@ -17903,7 +17891,7 @@
           <a:blip r:embed="rId4">
             <a:extLst>
               <a:ext uri="{96DAC541-7B7A-43D3-8B79-37D633B846F1}">
-                <asvg:svgBlip xmlns="" xmlns:asvg="http://schemas.microsoft.com/office/drawing/2016/SVG/main" r:embed="rId5"/>
+                <asvg:svgBlip xmlns:asvg="http://schemas.microsoft.com/office/drawing/2016/SVG/main" xmlns="" r:embed="rId5"/>
               </a:ext>
             </a:extLst>
           </a:blip>
@@ -20258,7 +20246,7 @@
           <a:blip r:embed="rId4">
             <a:extLst>
               <a:ext uri="{96DAC541-7B7A-43D3-8B79-37D633B846F1}">
-                <asvg:svgBlip xmlns="" xmlns:asvg="http://schemas.microsoft.com/office/drawing/2016/SVG/main" r:embed="rId5"/>
+                <asvg:svgBlip xmlns:asvg="http://schemas.microsoft.com/office/drawing/2016/SVG/main" xmlns="" r:embed="rId5"/>
               </a:ext>
             </a:extLst>
           </a:blip>
@@ -20427,8 +20415,8 @@
           <a:chExt cx="0" cy="0"/>
         </a:xfrm>
       </p:grpSpPr>
-      <mc:AlternateContent xmlns:mc="http://schemas.openxmlformats.org/markup-compatibility/2006" xmlns:a14="http://schemas.microsoft.com/office/drawing/2010/main">
-        <mc:Choice Requires="a14">
+      <mc:AlternateContent xmlns:mc="http://schemas.openxmlformats.org/markup-compatibility/2006">
+        <mc:Choice xmlns:a14="http://schemas.microsoft.com/office/drawing/2010/main" Requires="a14">
           <p:sp>
             <p:nvSpPr>
               <p:cNvPr id="15" name="内容占位符 2"/>
@@ -21130,6 +21118,13 @@
                     </m:r>
                   </m:oMath>
                 </a14:m>
+                <a:r>
+                  <a:rPr lang="zh-CN" altLang="en-US" dirty="0" smtClean="0">
+                    <a:latin typeface="Cambria Math" panose="02040503050406030204" pitchFamily="18" charset="0"/>
+                    <a:cs typeface="Cambria Math" panose="02040503050406030204" pitchFamily="18" charset="0"/>
+                  </a:rPr>
+                  <a:t>（可计算方法）</a:t>
+                </a:r>
                 <a:endParaRPr lang="en-US" altLang="zh-CN" dirty="0">
                   <a:latin typeface="Cambria Math" panose="02040503050406030204" pitchFamily="18" charset="0"/>
                   <a:cs typeface="Cambria Math" panose="02040503050406030204" pitchFamily="18" charset="0"/>
@@ -22222,7 +22217,7 @@
             </p:txBody>
           </p:sp>
         </mc:Choice>
-        <mc:Fallback xmlns="">
+        <mc:Fallback>
           <p:sp>
             <p:nvSpPr>
               <p:cNvPr id="15" name="内容占位符 2"/>
@@ -22319,7 +22314,7 @@
           <a:blip r:embed="rId4">
             <a:extLst>
               <a:ext uri="{96DAC541-7B7A-43D3-8B79-37D633B846F1}">
-                <asvg:svgBlip xmlns="" xmlns:asvg="http://schemas.microsoft.com/office/drawing/2016/SVG/main" r:embed="rId5"/>
+                <asvg:svgBlip xmlns:asvg="http://schemas.microsoft.com/office/drawing/2016/SVG/main" xmlns="" r:embed="rId5"/>
               </a:ext>
             </a:extLst>
           </a:blip>
@@ -22349,7 +22344,7 @@
           <a:blip r:embed="rId4">
             <a:extLst>
               <a:ext uri="{96DAC541-7B7A-43D3-8B79-37D633B846F1}">
-                <asvg:svgBlip xmlns="" xmlns:asvg="http://schemas.microsoft.com/office/drawing/2016/SVG/main" r:embed="rId5"/>
+                <asvg:svgBlip xmlns:asvg="http://schemas.microsoft.com/office/drawing/2016/SVG/main" xmlns="" r:embed="rId5"/>
               </a:ext>
             </a:extLst>
           </a:blip>
@@ -28482,7 +28477,7 @@
           <a:blip r:embed="rId2">
             <a:extLst>
               <a:ext uri="{96DAC541-7B7A-43D3-8B79-37D633B846F1}">
-                <asvg:svgBlip xmlns="" xmlns:asvg="http://schemas.microsoft.com/office/drawing/2016/SVG/main" r:embed="rId3"/>
+                <asvg:svgBlip xmlns:asvg="http://schemas.microsoft.com/office/drawing/2016/SVG/main" xmlns="" r:embed="rId3"/>
               </a:ext>
             </a:extLst>
           </a:blip>
@@ -28512,7 +28507,7 @@
           <a:blip r:embed="rId2">
             <a:extLst>
               <a:ext uri="{96DAC541-7B7A-43D3-8B79-37D633B846F1}">
-                <asvg:svgBlip xmlns="" xmlns:asvg="http://schemas.microsoft.com/office/drawing/2016/SVG/main" r:embed="rId3"/>
+                <asvg:svgBlip xmlns:asvg="http://schemas.microsoft.com/office/drawing/2016/SVG/main" xmlns="" r:embed="rId3"/>
               </a:ext>
             </a:extLst>
           </a:blip>
@@ -28542,7 +28537,7 @@
           <a:blip r:embed="rId2">
             <a:extLst>
               <a:ext uri="{96DAC541-7B7A-43D3-8B79-37D633B846F1}">
-                <asvg:svgBlip xmlns="" xmlns:asvg="http://schemas.microsoft.com/office/drawing/2016/SVG/main" r:embed="rId3"/>
+                <asvg:svgBlip xmlns:asvg="http://schemas.microsoft.com/office/drawing/2016/SVG/main" xmlns="" r:embed="rId3"/>
               </a:ext>
             </a:extLst>
           </a:blip>
@@ -28744,7 +28739,7 @@
           <a:blip r:embed="rId2">
             <a:extLst>
               <a:ext uri="{96DAC541-7B7A-43D3-8B79-37D633B846F1}">
-                <asvg:svgBlip xmlns="" xmlns:asvg="http://schemas.microsoft.com/office/drawing/2016/SVG/main" r:embed="rId3"/>
+                <asvg:svgBlip xmlns:asvg="http://schemas.microsoft.com/office/drawing/2016/SVG/main" xmlns="" r:embed="rId3"/>
               </a:ext>
             </a:extLst>
           </a:blip>
@@ -28774,7 +28769,7 @@
           <a:blip r:embed="rId2">
             <a:extLst>
               <a:ext uri="{96DAC541-7B7A-43D3-8B79-37D633B846F1}">
-                <asvg:svgBlip xmlns="" xmlns:asvg="http://schemas.microsoft.com/office/drawing/2016/SVG/main" r:embed="rId3"/>
+                <asvg:svgBlip xmlns:asvg="http://schemas.microsoft.com/office/drawing/2016/SVG/main" xmlns="" r:embed="rId3"/>
               </a:ext>
             </a:extLst>
           </a:blip>
@@ -30223,7 +30218,7 @@
           <a:blip r:embed="rId3">
             <a:extLst>
               <a:ext uri="{96DAC541-7B7A-43D3-8B79-37D633B846F1}">
-                <asvg:svgBlip xmlns="" xmlns:asvg="http://schemas.microsoft.com/office/drawing/2016/SVG/main" r:embed="rId4"/>
+                <asvg:svgBlip xmlns:asvg="http://schemas.microsoft.com/office/drawing/2016/SVG/main" xmlns="" r:embed="rId4"/>
               </a:ext>
             </a:extLst>
           </a:blip>
@@ -30253,7 +30248,7 @@
           <a:blip r:embed="rId3">
             <a:extLst>
               <a:ext uri="{96DAC541-7B7A-43D3-8B79-37D633B846F1}">
-                <asvg:svgBlip xmlns="" xmlns:asvg="http://schemas.microsoft.com/office/drawing/2016/SVG/main" r:embed="rId4"/>
+                <asvg:svgBlip xmlns:asvg="http://schemas.microsoft.com/office/drawing/2016/SVG/main" xmlns="" r:embed="rId4"/>
               </a:ext>
             </a:extLst>
           </a:blip>
@@ -30283,7 +30278,7 @@
           <a:blip r:embed="rId3">
             <a:extLst>
               <a:ext uri="{96DAC541-7B7A-43D3-8B79-37D633B846F1}">
-                <asvg:svgBlip xmlns="" xmlns:asvg="http://schemas.microsoft.com/office/drawing/2016/SVG/main" r:embed="rId4"/>
+                <asvg:svgBlip xmlns:asvg="http://schemas.microsoft.com/office/drawing/2016/SVG/main" xmlns="" r:embed="rId4"/>
               </a:ext>
             </a:extLst>
           </a:blip>
@@ -30313,7 +30308,7 @@
           <a:blip r:embed="rId3">
             <a:extLst>
               <a:ext uri="{96DAC541-7B7A-43D3-8B79-37D633B846F1}">
-                <asvg:svgBlip xmlns="" xmlns:asvg="http://schemas.microsoft.com/office/drawing/2016/SVG/main" r:embed="rId4"/>
+                <asvg:svgBlip xmlns:asvg="http://schemas.microsoft.com/office/drawing/2016/SVG/main" xmlns="" r:embed="rId4"/>
               </a:ext>
             </a:extLst>
           </a:blip>
@@ -31278,7 +31273,7 @@
           <a:blip r:embed="rId14">
             <a:extLst>
               <a:ext uri="{96DAC541-7B7A-43D3-8B79-37D633B846F1}">
-                <asvg:svgBlip xmlns="" xmlns:asvg="http://schemas.microsoft.com/office/drawing/2016/SVG/main" r:embed="rId15"/>
+                <asvg:svgBlip xmlns:asvg="http://schemas.microsoft.com/office/drawing/2016/SVG/main" xmlns="" r:embed="rId15"/>
               </a:ext>
             </a:extLst>
           </a:blip>
@@ -31308,7 +31303,7 @@
           <a:blip r:embed="rId14">
             <a:extLst>
               <a:ext uri="{96DAC541-7B7A-43D3-8B79-37D633B846F1}">
-                <asvg:svgBlip xmlns="" xmlns:asvg="http://schemas.microsoft.com/office/drawing/2016/SVG/main" r:embed="rId15"/>
+                <asvg:svgBlip xmlns:asvg="http://schemas.microsoft.com/office/drawing/2016/SVG/main" xmlns="" r:embed="rId15"/>
               </a:ext>
             </a:extLst>
           </a:blip>
@@ -31338,7 +31333,7 @@
           <a:blip r:embed="rId14">
             <a:extLst>
               <a:ext uri="{96DAC541-7B7A-43D3-8B79-37D633B846F1}">
-                <asvg:svgBlip xmlns="" xmlns:asvg="http://schemas.microsoft.com/office/drawing/2016/SVG/main" r:embed="rId15"/>
+                <asvg:svgBlip xmlns:asvg="http://schemas.microsoft.com/office/drawing/2016/SVG/main" xmlns="" r:embed="rId15"/>
               </a:ext>
             </a:extLst>
           </a:blip>
@@ -31368,7 +31363,7 @@
           <a:blip r:embed="rId14">
             <a:extLst>
               <a:ext uri="{96DAC541-7B7A-43D3-8B79-37D633B846F1}">
-                <asvg:svgBlip xmlns="" xmlns:asvg="http://schemas.microsoft.com/office/drawing/2016/SVG/main" r:embed="rId15"/>
+                <asvg:svgBlip xmlns:asvg="http://schemas.microsoft.com/office/drawing/2016/SVG/main" xmlns="" r:embed="rId15"/>
               </a:ext>
             </a:extLst>
           </a:blip>
@@ -31398,7 +31393,7 @@
           <a:blip r:embed="rId14">
             <a:extLst>
               <a:ext uri="{96DAC541-7B7A-43D3-8B79-37D633B846F1}">
-                <asvg:svgBlip xmlns="" xmlns:asvg="http://schemas.microsoft.com/office/drawing/2016/SVG/main" r:embed="rId15"/>
+                <asvg:svgBlip xmlns:asvg="http://schemas.microsoft.com/office/drawing/2016/SVG/main" xmlns="" r:embed="rId15"/>
               </a:ext>
             </a:extLst>
           </a:blip>
@@ -32653,21 +32648,21 @@
                 <a:gridCol w="2457688">
                   <a:extLst>
                     <a:ext uri="{9D8B030D-6E8A-4147-A177-3AD203B41FA5}">
-                      <a16:colId xmlns:a16="http://schemas.microsoft.com/office/drawing/2014/main" xmlns="" val="20000"/>
+                      <a16:colId xmlns="" xmlns:a16="http://schemas.microsoft.com/office/drawing/2014/main" val="20000"/>
                     </a:ext>
                   </a:extLst>
                 </a:gridCol>
                 <a:gridCol w="1812758">
                   <a:extLst>
                     <a:ext uri="{9D8B030D-6E8A-4147-A177-3AD203B41FA5}">
-                      <a16:colId xmlns:a16="http://schemas.microsoft.com/office/drawing/2014/main" xmlns="" val="20001"/>
+                      <a16:colId xmlns="" xmlns:a16="http://schemas.microsoft.com/office/drawing/2014/main" val="20001"/>
                     </a:ext>
                   </a:extLst>
                 </a:gridCol>
                 <a:gridCol w="3108158">
                   <a:extLst>
                     <a:ext uri="{9D8B030D-6E8A-4147-A177-3AD203B41FA5}">
-                      <a16:colId xmlns:a16="http://schemas.microsoft.com/office/drawing/2014/main" xmlns="" val="20002"/>
+                      <a16:colId xmlns="" xmlns:a16="http://schemas.microsoft.com/office/drawing/2014/main" val="20002"/>
                     </a:ext>
                   </a:extLst>
                 </a:gridCol>
@@ -32772,7 +32767,7 @@
                 </a:tc>
                 <a:extLst>
                   <a:ext uri="{0D108BD9-81ED-4DB2-BD59-A6C34878D82A}">
-                    <a16:rowId xmlns:a16="http://schemas.microsoft.com/office/drawing/2014/main" xmlns="" val="10000"/>
+                    <a16:rowId xmlns="" xmlns:a16="http://schemas.microsoft.com/office/drawing/2014/main" val="10000"/>
                   </a:ext>
                 </a:extLst>
               </a:tr>
@@ -32870,7 +32865,7 @@
                 </a:tc>
                 <a:extLst>
                   <a:ext uri="{0D108BD9-81ED-4DB2-BD59-A6C34878D82A}">
-                    <a16:rowId xmlns:a16="http://schemas.microsoft.com/office/drawing/2014/main" xmlns="" val="10001"/>
+                    <a16:rowId xmlns="" xmlns:a16="http://schemas.microsoft.com/office/drawing/2014/main" val="10001"/>
                   </a:ext>
                 </a:extLst>
               </a:tr>
@@ -32961,7 +32956,7 @@
                 </a:tc>
                 <a:extLst>
                   <a:ext uri="{0D108BD9-81ED-4DB2-BD59-A6C34878D82A}">
-                    <a16:rowId xmlns:a16="http://schemas.microsoft.com/office/drawing/2014/main" xmlns="" val="10002"/>
+                    <a16:rowId xmlns="" xmlns:a16="http://schemas.microsoft.com/office/drawing/2014/main" val="10002"/>
                   </a:ext>
                 </a:extLst>
               </a:tr>
@@ -33066,7 +33061,7 @@
                 </a:tc>
                 <a:extLst>
                   <a:ext uri="{0D108BD9-81ED-4DB2-BD59-A6C34878D82A}">
-                    <a16:rowId xmlns:a16="http://schemas.microsoft.com/office/drawing/2014/main" xmlns="" val="10003"/>
+                    <a16:rowId xmlns="" xmlns:a16="http://schemas.microsoft.com/office/drawing/2014/main" val="10003"/>
                   </a:ext>
                 </a:extLst>
               </a:tr>
@@ -33157,7 +33152,7 @@
                 </a:tc>
                 <a:extLst>
                   <a:ext uri="{0D108BD9-81ED-4DB2-BD59-A6C34878D82A}">
-                    <a16:rowId xmlns:a16="http://schemas.microsoft.com/office/drawing/2014/main" xmlns="" val="10004"/>
+                    <a16:rowId xmlns="" xmlns:a16="http://schemas.microsoft.com/office/drawing/2014/main" val="10004"/>
                   </a:ext>
                 </a:extLst>
               </a:tr>
@@ -33254,7 +33249,7 @@
           <a:blip r:embed="rId6">
             <a:extLst>
               <a:ext uri="{96DAC541-7B7A-43D3-8B79-37D633B846F1}">
-                <asvg:svgBlip xmlns="" xmlns:asvg="http://schemas.microsoft.com/office/drawing/2016/SVG/main" r:embed="rId7"/>
+                <asvg:svgBlip xmlns:asvg="http://schemas.microsoft.com/office/drawing/2016/SVG/main" xmlns="" r:embed="rId7"/>
               </a:ext>
             </a:extLst>
           </a:blip>

</xml_diff>